<commit_message>
Edit P1C3 if statement concept.
</commit_message>
<xml_diff>
--- a/public/resources/ppt-slides/control-flow-if-else-statement.pptx
+++ b/public/resources/ppt-slides/control-flow-if-else-statement.pptx
@@ -249,7 +249,7 @@
           <a:p>
             <a:fld id="{964302DC-9F53-934F-AE4D-0F1F197008C1}" type="datetimeFigureOut">
               <a:rPr lang="en-US" smtClean="0"/>
-              <a:t>10/3/23</a:t>
+              <a:t>2/2/24</a:t>
             </a:fld>
             <a:endParaRPr lang="en-US"/>
           </a:p>
@@ -419,7 +419,7 @@
           <a:p>
             <a:fld id="{964302DC-9F53-934F-AE4D-0F1F197008C1}" type="datetimeFigureOut">
               <a:rPr lang="en-US" smtClean="0"/>
-              <a:t>10/3/23</a:t>
+              <a:t>2/2/24</a:t>
             </a:fld>
             <a:endParaRPr lang="en-US"/>
           </a:p>
@@ -599,7 +599,7 @@
           <a:p>
             <a:fld id="{964302DC-9F53-934F-AE4D-0F1F197008C1}" type="datetimeFigureOut">
               <a:rPr lang="en-US" smtClean="0"/>
-              <a:t>10/3/23</a:t>
+              <a:t>2/2/24</a:t>
             </a:fld>
             <a:endParaRPr lang="en-US"/>
           </a:p>
@@ -769,7 +769,7 @@
           <a:p>
             <a:fld id="{964302DC-9F53-934F-AE4D-0F1F197008C1}" type="datetimeFigureOut">
               <a:rPr lang="en-US" smtClean="0"/>
-              <a:t>10/3/23</a:t>
+              <a:t>2/2/24</a:t>
             </a:fld>
             <a:endParaRPr lang="en-US"/>
           </a:p>
@@ -1015,7 +1015,7 @@
           <a:p>
             <a:fld id="{964302DC-9F53-934F-AE4D-0F1F197008C1}" type="datetimeFigureOut">
               <a:rPr lang="en-US" smtClean="0"/>
-              <a:t>10/3/23</a:t>
+              <a:t>2/2/24</a:t>
             </a:fld>
             <a:endParaRPr lang="en-US"/>
           </a:p>
@@ -1247,7 +1247,7 @@
           <a:p>
             <a:fld id="{964302DC-9F53-934F-AE4D-0F1F197008C1}" type="datetimeFigureOut">
               <a:rPr lang="en-US" smtClean="0"/>
-              <a:t>10/3/23</a:t>
+              <a:t>2/2/24</a:t>
             </a:fld>
             <a:endParaRPr lang="en-US"/>
           </a:p>
@@ -1614,7 +1614,7 @@
           <a:p>
             <a:fld id="{964302DC-9F53-934F-AE4D-0F1F197008C1}" type="datetimeFigureOut">
               <a:rPr lang="en-US" smtClean="0"/>
-              <a:t>10/3/23</a:t>
+              <a:t>2/2/24</a:t>
             </a:fld>
             <a:endParaRPr lang="en-US"/>
           </a:p>
@@ -1732,7 +1732,7 @@
           <a:p>
             <a:fld id="{964302DC-9F53-934F-AE4D-0F1F197008C1}" type="datetimeFigureOut">
               <a:rPr lang="en-US" smtClean="0"/>
-              <a:t>10/3/23</a:t>
+              <a:t>2/2/24</a:t>
             </a:fld>
             <a:endParaRPr lang="en-US"/>
           </a:p>
@@ -1827,7 +1827,7 @@
           <a:p>
             <a:fld id="{964302DC-9F53-934F-AE4D-0F1F197008C1}" type="datetimeFigureOut">
               <a:rPr lang="en-US" smtClean="0"/>
-              <a:t>10/3/23</a:t>
+              <a:t>2/2/24</a:t>
             </a:fld>
             <a:endParaRPr lang="en-US"/>
           </a:p>
@@ -2104,7 +2104,7 @@
           <a:p>
             <a:fld id="{964302DC-9F53-934F-AE4D-0F1F197008C1}" type="datetimeFigureOut">
               <a:rPr lang="en-US" smtClean="0"/>
-              <a:t>10/3/23</a:t>
+              <a:t>2/2/24</a:t>
             </a:fld>
             <a:endParaRPr lang="en-US"/>
           </a:p>
@@ -2361,7 +2361,7 @@
           <a:p>
             <a:fld id="{964302DC-9F53-934F-AE4D-0F1F197008C1}" type="datetimeFigureOut">
               <a:rPr lang="en-US" smtClean="0"/>
-              <a:t>10/3/23</a:t>
+              <a:t>2/2/24</a:t>
             </a:fld>
             <a:endParaRPr lang="en-US"/>
           </a:p>
@@ -2574,7 +2574,7 @@
           <a:p>
             <a:fld id="{964302DC-9F53-934F-AE4D-0F1F197008C1}" type="datetimeFigureOut">
               <a:rPr lang="en-US" smtClean="0"/>
-              <a:t>10/3/23</a:t>
+              <a:t>2/2/24</a:t>
             </a:fld>
             <a:endParaRPr lang="en-US"/>
           </a:p>
@@ -2973,7 +2973,7 @@
           </a:blip>
           <a:srcRect/>
           <a:stretch>
-            <a:fillRect/>
+            <a:fillRect t="-4000" b="-4000"/>
           </a:stretch>
         </a:blipFill>
         <a:effectLst/>
@@ -17382,60 +17382,44 @@
             <a:custGeom>
               <a:avLst/>
               <a:gdLst>
-                <a:gd name="connsiteX0" fmla="*/ 0 w 6685443"/>
-                <a:gd name="connsiteY0" fmla="*/ 0 h 1815499"/>
-                <a:gd name="connsiteX1" fmla="*/ 601690 w 6685443"/>
-                <a:gd name="connsiteY1" fmla="*/ 0 h 1815499"/>
-                <a:gd name="connsiteX2" fmla="*/ 1069671 w 6685443"/>
-                <a:gd name="connsiteY2" fmla="*/ 0 h 1815499"/>
-                <a:gd name="connsiteX3" fmla="*/ 1871924 w 6685443"/>
-                <a:gd name="connsiteY3" fmla="*/ 0 h 1815499"/>
-                <a:gd name="connsiteX4" fmla="*/ 2473614 w 6685443"/>
-                <a:gd name="connsiteY4" fmla="*/ 0 h 1815499"/>
-                <a:gd name="connsiteX5" fmla="*/ 3075304 w 6685443"/>
-                <a:gd name="connsiteY5" fmla="*/ 0 h 1815499"/>
-                <a:gd name="connsiteX6" fmla="*/ 3877557 w 6685443"/>
-                <a:gd name="connsiteY6" fmla="*/ 0 h 1815499"/>
-                <a:gd name="connsiteX7" fmla="*/ 4412392 w 6685443"/>
-                <a:gd name="connsiteY7" fmla="*/ 0 h 1815499"/>
-                <a:gd name="connsiteX8" fmla="*/ 5214646 w 6685443"/>
-                <a:gd name="connsiteY8" fmla="*/ 0 h 1815499"/>
-                <a:gd name="connsiteX9" fmla="*/ 6016899 w 6685443"/>
-                <a:gd name="connsiteY9" fmla="*/ 0 h 1815499"/>
-                <a:gd name="connsiteX10" fmla="*/ 6685443 w 6685443"/>
-                <a:gd name="connsiteY10" fmla="*/ 0 h 1815499"/>
-                <a:gd name="connsiteX11" fmla="*/ 6685443 w 6685443"/>
-                <a:gd name="connsiteY11" fmla="*/ 641476 h 1815499"/>
-                <a:gd name="connsiteX12" fmla="*/ 6685443 w 6685443"/>
-                <a:gd name="connsiteY12" fmla="*/ 1264798 h 1815499"/>
-                <a:gd name="connsiteX13" fmla="*/ 6685443 w 6685443"/>
-                <a:gd name="connsiteY13" fmla="*/ 1815499 h 1815499"/>
-                <a:gd name="connsiteX14" fmla="*/ 6016899 w 6685443"/>
-                <a:gd name="connsiteY14" fmla="*/ 1815499 h 1815499"/>
-                <a:gd name="connsiteX15" fmla="*/ 5482063 w 6685443"/>
-                <a:gd name="connsiteY15" fmla="*/ 1815499 h 1815499"/>
-                <a:gd name="connsiteX16" fmla="*/ 4813519 w 6685443"/>
-                <a:gd name="connsiteY16" fmla="*/ 1815499 h 1815499"/>
-                <a:gd name="connsiteX17" fmla="*/ 4011266 w 6685443"/>
-                <a:gd name="connsiteY17" fmla="*/ 1815499 h 1815499"/>
-                <a:gd name="connsiteX18" fmla="*/ 3342722 w 6685443"/>
-                <a:gd name="connsiteY18" fmla="*/ 1815499 h 1815499"/>
-                <a:gd name="connsiteX19" fmla="*/ 2874740 w 6685443"/>
-                <a:gd name="connsiteY19" fmla="*/ 1815499 h 1815499"/>
-                <a:gd name="connsiteX20" fmla="*/ 2339905 w 6685443"/>
-                <a:gd name="connsiteY20" fmla="*/ 1815499 h 1815499"/>
-                <a:gd name="connsiteX21" fmla="*/ 1537652 w 6685443"/>
-                <a:gd name="connsiteY21" fmla="*/ 1815499 h 1815499"/>
-                <a:gd name="connsiteX22" fmla="*/ 869108 w 6685443"/>
-                <a:gd name="connsiteY22" fmla="*/ 1815499 h 1815499"/>
-                <a:gd name="connsiteX23" fmla="*/ 0 w 6685443"/>
-                <a:gd name="connsiteY23" fmla="*/ 1815499 h 1815499"/>
-                <a:gd name="connsiteX24" fmla="*/ 0 w 6685443"/>
-                <a:gd name="connsiteY24" fmla="*/ 1210333 h 1815499"/>
-                <a:gd name="connsiteX25" fmla="*/ 0 w 6685443"/>
-                <a:gd name="connsiteY25" fmla="*/ 659631 h 1815499"/>
-                <a:gd name="connsiteX26" fmla="*/ 0 w 6685443"/>
-                <a:gd name="connsiteY26" fmla="*/ 0 h 1815499"/>
+                <a:gd name="connsiteX0" fmla="*/ 0 w 3984159"/>
+                <a:gd name="connsiteY0" fmla="*/ 0 h 1483208"/>
+                <a:gd name="connsiteX1" fmla="*/ 624185 w 3984159"/>
+                <a:gd name="connsiteY1" fmla="*/ 0 h 1483208"/>
+                <a:gd name="connsiteX2" fmla="*/ 1168687 w 3984159"/>
+                <a:gd name="connsiteY2" fmla="*/ 0 h 1483208"/>
+                <a:gd name="connsiteX3" fmla="*/ 1912396 w 3984159"/>
+                <a:gd name="connsiteY3" fmla="*/ 0 h 1483208"/>
+                <a:gd name="connsiteX4" fmla="*/ 2536581 w 3984159"/>
+                <a:gd name="connsiteY4" fmla="*/ 0 h 1483208"/>
+                <a:gd name="connsiteX5" fmla="*/ 3160766 w 3984159"/>
+                <a:gd name="connsiteY5" fmla="*/ 0 h 1483208"/>
+                <a:gd name="connsiteX6" fmla="*/ 3984159 w 3984159"/>
+                <a:gd name="connsiteY6" fmla="*/ 0 h 1483208"/>
+                <a:gd name="connsiteX7" fmla="*/ 3984159 w 3984159"/>
+                <a:gd name="connsiteY7" fmla="*/ 464739 h 1483208"/>
+                <a:gd name="connsiteX8" fmla="*/ 3984159 w 3984159"/>
+                <a:gd name="connsiteY8" fmla="*/ 959141 h 1483208"/>
+                <a:gd name="connsiteX9" fmla="*/ 3984159 w 3984159"/>
+                <a:gd name="connsiteY9" fmla="*/ 1483208 h 1483208"/>
+                <a:gd name="connsiteX10" fmla="*/ 3399816 w 3984159"/>
+                <a:gd name="connsiteY10" fmla="*/ 1483208 h 1483208"/>
+                <a:gd name="connsiteX11" fmla="*/ 2735789 w 3984159"/>
+                <a:gd name="connsiteY11" fmla="*/ 1483208 h 1483208"/>
+                <a:gd name="connsiteX12" fmla="*/ 2111604 w 3984159"/>
+                <a:gd name="connsiteY12" fmla="*/ 1483208 h 1483208"/>
+                <a:gd name="connsiteX13" fmla="*/ 1367895 w 3984159"/>
+                <a:gd name="connsiteY13" fmla="*/ 1483208 h 1483208"/>
+                <a:gd name="connsiteX14" fmla="*/ 624185 w 3984159"/>
+                <a:gd name="connsiteY14" fmla="*/ 1483208 h 1483208"/>
+                <a:gd name="connsiteX15" fmla="*/ 0 w 3984159"/>
+                <a:gd name="connsiteY15" fmla="*/ 1483208 h 1483208"/>
+                <a:gd name="connsiteX16" fmla="*/ 0 w 3984159"/>
+                <a:gd name="connsiteY16" fmla="*/ 988805 h 1483208"/>
+                <a:gd name="connsiteX17" fmla="*/ 0 w 3984159"/>
+                <a:gd name="connsiteY17" fmla="*/ 509235 h 1483208"/>
+                <a:gd name="connsiteX18" fmla="*/ 0 w 3984159"/>
+                <a:gd name="connsiteY18" fmla="*/ 0 h 1483208"/>
               </a:gdLst>
               <a:ahLst/>
               <a:cxnLst>
@@ -17496,165 +17480,101 @@
                 <a:cxn ang="0">
                   <a:pos x="connsiteX18" y="connsiteY18"/>
                 </a:cxn>
-                <a:cxn ang="0">
-                  <a:pos x="connsiteX19" y="connsiteY19"/>
-                </a:cxn>
-                <a:cxn ang="0">
-                  <a:pos x="connsiteX20" y="connsiteY20"/>
-                </a:cxn>
-                <a:cxn ang="0">
-                  <a:pos x="connsiteX21" y="connsiteY21"/>
-                </a:cxn>
-                <a:cxn ang="0">
-                  <a:pos x="connsiteX22" y="connsiteY22"/>
-                </a:cxn>
-                <a:cxn ang="0">
-                  <a:pos x="connsiteX23" y="connsiteY23"/>
-                </a:cxn>
-                <a:cxn ang="0">
-                  <a:pos x="connsiteX24" y="connsiteY24"/>
-                </a:cxn>
-                <a:cxn ang="0">
-                  <a:pos x="connsiteX25" y="connsiteY25"/>
-                </a:cxn>
-                <a:cxn ang="0">
-                  <a:pos x="connsiteX26" y="connsiteY26"/>
-                </a:cxn>
               </a:cxnLst>
               <a:rect l="l" t="t" r="r" b="b"/>
               <a:pathLst>
-                <a:path w="6685443" h="1815499" extrusionOk="0">
+                <a:path w="3984159" h="1483208" extrusionOk="0">
                   <a:moveTo>
                     <a:pt x="0" y="0"/>
                   </a:moveTo>
                   <a:cubicBezTo>
-                    <a:pt x="197687" y="5421"/>
-                    <a:pt x="392637" y="-27165"/>
-                    <a:pt x="601690" y="0"/>
-                  </a:cubicBezTo>
-                  <a:cubicBezTo>
-                    <a:pt x="810743" y="27165"/>
-                    <a:pt x="967174" y="20034"/>
-                    <a:pt x="1069671" y="0"/>
-                  </a:cubicBezTo>
-                  <a:cubicBezTo>
-                    <a:pt x="1172168" y="-20034"/>
-                    <a:pt x="1481114" y="26288"/>
-                    <a:pt x="1871924" y="0"/>
-                  </a:cubicBezTo>
-                  <a:cubicBezTo>
-                    <a:pt x="2262734" y="-26288"/>
-                    <a:pt x="2275646" y="9816"/>
-                    <a:pt x="2473614" y="0"/>
-                  </a:cubicBezTo>
-                  <a:cubicBezTo>
-                    <a:pt x="2671582" y="-9816"/>
-                    <a:pt x="2837715" y="-16866"/>
-                    <a:pt x="3075304" y="0"/>
-                  </a:cubicBezTo>
-                  <a:cubicBezTo>
-                    <a:pt x="3312893" y="16866"/>
-                    <a:pt x="3565082" y="13656"/>
-                    <a:pt x="3877557" y="0"/>
-                  </a:cubicBezTo>
-                  <a:cubicBezTo>
-                    <a:pt x="4190032" y="-13656"/>
-                    <a:pt x="4275680" y="23045"/>
-                    <a:pt x="4412392" y="0"/>
-                  </a:cubicBezTo>
-                  <a:cubicBezTo>
-                    <a:pt x="4549105" y="-23045"/>
-                    <a:pt x="4974381" y="13533"/>
-                    <a:pt x="5214646" y="0"/>
-                  </a:cubicBezTo>
-                  <a:cubicBezTo>
-                    <a:pt x="5454911" y="-13533"/>
-                    <a:pt x="5621382" y="6072"/>
-                    <a:pt x="6016899" y="0"/>
-                  </a:cubicBezTo>
-                  <a:cubicBezTo>
-                    <a:pt x="6412416" y="-6072"/>
-                    <a:pt x="6368099" y="-22480"/>
-                    <a:pt x="6685443" y="0"/>
-                  </a:cubicBezTo>
-                  <a:cubicBezTo>
-                    <a:pt x="6675060" y="141143"/>
-                    <a:pt x="6688790" y="422707"/>
-                    <a:pt x="6685443" y="641476"/>
-                  </a:cubicBezTo>
-                  <a:cubicBezTo>
-                    <a:pt x="6682096" y="860245"/>
-                    <a:pt x="6676921" y="1110529"/>
-                    <a:pt x="6685443" y="1264798"/>
-                  </a:cubicBezTo>
-                  <a:cubicBezTo>
-                    <a:pt x="6693965" y="1419067"/>
-                    <a:pt x="6712438" y="1626237"/>
-                    <a:pt x="6685443" y="1815499"/>
-                  </a:cubicBezTo>
-                  <a:cubicBezTo>
-                    <a:pt x="6531485" y="1826631"/>
-                    <a:pt x="6258288" y="1826162"/>
-                    <a:pt x="6016899" y="1815499"/>
-                  </a:cubicBezTo>
-                  <a:cubicBezTo>
-                    <a:pt x="5775510" y="1804836"/>
-                    <a:pt x="5635687" y="1808580"/>
-                    <a:pt x="5482063" y="1815499"/>
-                  </a:cubicBezTo>
-                  <a:cubicBezTo>
-                    <a:pt x="5328439" y="1822418"/>
-                    <a:pt x="4969533" y="1798322"/>
-                    <a:pt x="4813519" y="1815499"/>
-                  </a:cubicBezTo>
-                  <a:cubicBezTo>
-                    <a:pt x="4657505" y="1832676"/>
-                    <a:pt x="4277484" y="1797792"/>
-                    <a:pt x="4011266" y="1815499"/>
-                  </a:cubicBezTo>
-                  <a:cubicBezTo>
-                    <a:pt x="3745048" y="1833206"/>
-                    <a:pt x="3503887" y="1798854"/>
-                    <a:pt x="3342722" y="1815499"/>
-                  </a:cubicBezTo>
-                  <a:cubicBezTo>
-                    <a:pt x="3181557" y="1832144"/>
-                    <a:pt x="3094655" y="1808958"/>
-                    <a:pt x="2874740" y="1815499"/>
-                  </a:cubicBezTo>
-                  <a:cubicBezTo>
-                    <a:pt x="2654825" y="1822040"/>
-                    <a:pt x="2552356" y="1810430"/>
-                    <a:pt x="2339905" y="1815499"/>
-                  </a:cubicBezTo>
-                  <a:cubicBezTo>
-                    <a:pt x="2127454" y="1820568"/>
-                    <a:pt x="1825409" y="1807327"/>
-                    <a:pt x="1537652" y="1815499"/>
-                  </a:cubicBezTo>
-                  <a:cubicBezTo>
-                    <a:pt x="1249895" y="1823671"/>
-                    <a:pt x="1086879" y="1834794"/>
-                    <a:pt x="869108" y="1815499"/>
-                  </a:cubicBezTo>
-                  <a:cubicBezTo>
-                    <a:pt x="651337" y="1796204"/>
-                    <a:pt x="264417" y="1828267"/>
-                    <a:pt x="0" y="1815499"/>
-                  </a:cubicBezTo>
-                  <a:cubicBezTo>
-                    <a:pt x="8313" y="1520428"/>
-                    <a:pt x="-1936" y="1449694"/>
-                    <a:pt x="0" y="1210333"/>
-                  </a:cubicBezTo>
-                  <a:cubicBezTo>
-                    <a:pt x="1936" y="970972"/>
-                    <a:pt x="16209" y="905402"/>
-                    <a:pt x="0" y="659631"/>
-                  </a:cubicBezTo>
-                  <a:cubicBezTo>
-                    <a:pt x="-16209" y="413860"/>
-                    <a:pt x="-15680" y="309233"/>
+                    <a:pt x="183423" y="18876"/>
+                    <a:pt x="387432" y="11885"/>
+                    <a:pt x="624185" y="0"/>
+                  </a:cubicBezTo>
+                  <a:cubicBezTo>
+                    <a:pt x="860939" y="-11885"/>
+                    <a:pt x="1048729" y="-23800"/>
+                    <a:pt x="1168687" y="0"/>
+                  </a:cubicBezTo>
+                  <a:cubicBezTo>
+                    <a:pt x="1288645" y="23800"/>
+                    <a:pt x="1695960" y="-33979"/>
+                    <a:pt x="1912396" y="0"/>
+                  </a:cubicBezTo>
+                  <a:cubicBezTo>
+                    <a:pt x="2128832" y="33979"/>
+                    <a:pt x="2399161" y="-14960"/>
+                    <a:pt x="2536581" y="0"/>
+                  </a:cubicBezTo>
+                  <a:cubicBezTo>
+                    <a:pt x="2674002" y="14960"/>
+                    <a:pt x="2929243" y="21111"/>
+                    <a:pt x="3160766" y="0"/>
+                  </a:cubicBezTo>
+                  <a:cubicBezTo>
+                    <a:pt x="3392290" y="-21111"/>
+                    <a:pt x="3618234" y="22549"/>
+                    <a:pt x="3984159" y="0"/>
+                  </a:cubicBezTo>
+                  <a:cubicBezTo>
+                    <a:pt x="3984039" y="195374"/>
+                    <a:pt x="3982040" y="245726"/>
+                    <a:pt x="3984159" y="464739"/>
+                  </a:cubicBezTo>
+                  <a:cubicBezTo>
+                    <a:pt x="3986278" y="683752"/>
+                    <a:pt x="3968176" y="738445"/>
+                    <a:pt x="3984159" y="959141"/>
+                  </a:cubicBezTo>
+                  <a:cubicBezTo>
+                    <a:pt x="4000142" y="1179837"/>
+                    <a:pt x="4006930" y="1289598"/>
+                    <a:pt x="3984159" y="1483208"/>
+                  </a:cubicBezTo>
+                  <a:cubicBezTo>
+                    <a:pt x="3803423" y="1507410"/>
+                    <a:pt x="3621946" y="1507539"/>
+                    <a:pt x="3399816" y="1483208"/>
+                  </a:cubicBezTo>
+                  <a:cubicBezTo>
+                    <a:pt x="3177686" y="1458877"/>
+                    <a:pt x="2949392" y="1453742"/>
+                    <a:pt x="2735789" y="1483208"/>
+                  </a:cubicBezTo>
+                  <a:cubicBezTo>
+                    <a:pt x="2522186" y="1512674"/>
+                    <a:pt x="2349139" y="1474501"/>
+                    <a:pt x="2111604" y="1483208"/>
+                  </a:cubicBezTo>
+                  <a:cubicBezTo>
+                    <a:pt x="1874070" y="1491915"/>
+                    <a:pt x="1572750" y="1491084"/>
+                    <a:pt x="1367895" y="1483208"/>
+                  </a:cubicBezTo>
+                  <a:cubicBezTo>
+                    <a:pt x="1163040" y="1475332"/>
+                    <a:pt x="793837" y="1458218"/>
+                    <a:pt x="624185" y="1483208"/>
+                  </a:cubicBezTo>
+                  <a:cubicBezTo>
+                    <a:pt x="454533" y="1508199"/>
+                    <a:pt x="282889" y="1481339"/>
+                    <a:pt x="0" y="1483208"/>
+                  </a:cubicBezTo>
+                  <a:cubicBezTo>
+                    <a:pt x="24368" y="1316907"/>
+                    <a:pt x="-24567" y="1129752"/>
+                    <a:pt x="0" y="988805"/>
+                  </a:cubicBezTo>
+                  <a:cubicBezTo>
+                    <a:pt x="24567" y="847858"/>
+                    <a:pt x="2696" y="683175"/>
+                    <a:pt x="0" y="509235"/>
+                  </a:cubicBezTo>
+                  <a:cubicBezTo>
+                    <a:pt x="-2696" y="335295"/>
+                    <a:pt x="22160" y="109840"/>
                     <a:pt x="0" y="0"/>
                   </a:cubicBezTo>
                   <a:close/>

</xml_diff>